<commit_message>
Updates to milestone1 presentation
</commit_message>
<xml_diff>
--- a/docs/Presentations/Milestone1Presentation.pptx
+++ b/docs/Presentations/Milestone1Presentation.pptx
@@ -4013,13 +4013,133 @@
         </p:nvSpPr>
         <p:spPr/>
         <p:txBody>
-          <a:bodyPr/>
-          <a:lstStyle/>
-          <a:p>
+          <a:bodyPr>
+            <a:normAutofit fontScale="70000" lnSpcReduction="20000"/>
+          </a:bodyPr>
+          <a:lstStyle/>
+          <a:p>
+            <a:pPr marL="0" indent="0">
+              <a:buNone/>
+            </a:pPr>
+            <a:r>
+              <a:rPr lang="en-US" dirty="0"/>
+              <a:t>Our overall vision is to create a centralized web application that will provide tools to assist scientists in managing experiment plate sets and with the analysis of experimental results</a:t>
+            </a:r>
             <a:r>
               <a:rPr lang="en-US" dirty="0" smtClean="0"/>
-              <a:t>Big picture</a:t>
-            </a:r>
+              <a:t>.</a:t>
+            </a:r>
+            <a:r>
+              <a:rPr lang="en-US" dirty="0"/>
+              <a:t> </a:t>
+            </a:r>
+          </a:p>
+          <a:p>
+            <a:pPr marL="0" indent="0">
+              <a:buNone/>
+            </a:pPr>
+            <a:r>
+              <a:rPr lang="en-US" dirty="0"/>
+              <a:t>The team focus is providing outstanding tools to assist in analyzing the dose response characteristics potential drugs.</a:t>
+            </a:r>
+          </a:p>
+          <a:p>
+            <a:pPr marL="0" indent="0">
+              <a:buNone/>
+            </a:pPr>
+            <a:r>
+              <a:rPr lang="en-US" dirty="0"/>
+              <a:t> </a:t>
+            </a:r>
+          </a:p>
+          <a:p>
+            <a:pPr marL="0" indent="0">
+              <a:buNone/>
+            </a:pPr>
+            <a:r>
+              <a:rPr lang="en-US" dirty="0"/>
+              <a:t>We will provide beautiful interactive visualization tools that will assist the scientist in:</a:t>
+            </a:r>
+          </a:p>
+          <a:p>
+            <a:pPr marL="0" indent="0">
+              <a:buNone/>
+            </a:pPr>
+            <a:r>
+              <a:rPr lang="en-US" dirty="0"/>
+              <a:t> </a:t>
+            </a:r>
+          </a:p>
+          <a:p>
+            <a:pPr lvl="0"/>
+            <a:r>
+              <a:rPr lang="en-US" dirty="0"/>
+              <a:t>Creating and managing experimental plate sets for dose response experiments</a:t>
+            </a:r>
+          </a:p>
+          <a:p>
+            <a:pPr lvl="0"/>
+            <a:r>
+              <a:rPr lang="en-US" dirty="0"/>
+              <a:t>Performing quality control checks on plate results and plate controls</a:t>
+            </a:r>
+          </a:p>
+          <a:p>
+            <a:pPr lvl="0"/>
+            <a:r>
+              <a:rPr lang="en-US" dirty="0"/>
+              <a:t>Performing Interactive analysis of dose response results.</a:t>
+            </a:r>
+          </a:p>
+          <a:p>
+            <a:pPr marL="0" indent="0">
+              <a:buNone/>
+            </a:pPr>
+            <a:r>
+              <a:rPr lang="en-US" dirty="0"/>
+              <a:t> </a:t>
+            </a:r>
+          </a:p>
+          <a:p>
+            <a:pPr marL="0" indent="0">
+              <a:buNone/>
+            </a:pPr>
+            <a:r>
+              <a:rPr lang="en-US" dirty="0"/>
+              <a:t> </a:t>
+            </a:r>
+          </a:p>
+          <a:p>
+            <a:pPr marL="0" indent="0">
+              <a:buNone/>
+            </a:pPr>
+            <a:r>
+              <a:rPr lang="en-US" dirty="0"/>
+              <a:t>The team will store the experimental results and the analysis of the results so that the historic experimental analysis can be reviewed or reproduced at any time.</a:t>
+            </a:r>
+          </a:p>
+          <a:p>
+            <a:pPr marL="0" indent="0">
+              <a:buNone/>
+            </a:pPr>
+            <a:r>
+              <a:rPr lang="en-US" dirty="0"/>
+              <a:t> </a:t>
+            </a:r>
+          </a:p>
+          <a:p>
+            <a:pPr marL="0" indent="0">
+              <a:buNone/>
+            </a:pPr>
+            <a:r>
+              <a:rPr lang="en-US" dirty="0"/>
+              <a:t>Scientists will be able to save the results for further analysis or publish their analysis, making it available to all other users.</a:t>
+            </a:r>
+          </a:p>
+          <a:p>
+            <a:pPr marL="0" indent="0">
+              <a:buNone/>
+            </a:pPr>
             <a:endParaRPr lang="en-US" dirty="0"/>
           </a:p>
         </p:txBody>
@@ -4089,19 +4209,61 @@
         </p:nvSpPr>
         <p:spPr/>
         <p:txBody>
-          <a:bodyPr/>
-          <a:lstStyle/>
-          <a:p>
+          <a:bodyPr>
+            <a:normAutofit fontScale="85000" lnSpcReduction="20000"/>
+          </a:bodyPr>
+          <a:lstStyle/>
+          <a:p>
+            <a:pPr marL="0" indent="0">
+              <a:buNone/>
+            </a:pPr>
+            <a:r>
+              <a:rPr lang="en-US" dirty="0"/>
+              <a:t>New drug development is a time consuming and expensive process. In the early stages of drug discovery millions of compounds are screened and tested on the road to finding a few candidates for further exploratory development.</a:t>
+            </a:r>
+          </a:p>
+          <a:p>
+            <a:pPr marL="0" indent="0">
+              <a:buNone/>
+            </a:pPr>
+            <a:endParaRPr lang="en-US" dirty="0" smtClean="0"/>
+          </a:p>
+          <a:p>
+            <a:pPr marL="0" indent="0">
+              <a:buNone/>
+            </a:pPr>
             <a:r>
               <a:rPr lang="en-US" dirty="0" smtClean="0"/>
-              <a:t>Value Add</a:t>
-            </a:r>
-          </a:p>
-          <a:p>
+              <a:t>High </a:t>
+            </a:r>
+            <a:r>
+              <a:rPr lang="en-US" dirty="0"/>
+              <a:t>throughput screening is a method scientists use in the early stages of drug discovery to test millions of potential drugs. The method allows scientist to quickly identify candidates. While the process is highly automated, a disparate selection software of software tools are often used to manage plate sets and analyze results. Commercial software to manage the process is often extremely expensive</a:t>
+            </a:r>
+          </a:p>
+          <a:p>
+            <a:pPr marL="0" indent="0">
+              <a:buNone/>
+            </a:pPr>
+            <a:endParaRPr lang="en-US" dirty="0" smtClean="0"/>
+          </a:p>
+          <a:p>
+            <a:pPr marL="0" indent="0">
+              <a:buNone/>
+            </a:pPr>
             <a:r>
               <a:rPr lang="en-US" dirty="0" smtClean="0"/>
-              <a:t>What problems we are addressing</a:t>
-            </a:r>
+              <a:t>The </a:t>
+            </a:r>
+            <a:r>
+              <a:rPr lang="en-US" dirty="0"/>
+              <a:t>We99 team is proposing releasing an integrated suite of open source web based tools. The team believes that the tools will enable scientists to be more organized and efficient when screening and analyzing potential drugs. Time savings will allow scientist to more effectively eliminate compounds earlier in the discovery cycle potentially saving companies millions of dollars.</a:t>
+            </a:r>
+          </a:p>
+          <a:p>
+            <a:pPr marL="0" indent="0">
+              <a:buNone/>
+            </a:pPr>
             <a:endParaRPr lang="en-US" dirty="0"/>
           </a:p>
         </p:txBody>

</xml_diff>